<commit_message>
day 1 R part 10
</commit_message>
<xml_diff>
--- a/Rivanna_Practicums/1.Introduction/Figures/base_figs.pptx
+++ b/Rivanna_Practicums/1.Introduction/Figures/base_figs.pptx
@@ -3321,6 +3321,60 @@
           <a:chExt cx="0" cy="0"/>
         </a:xfrm>
       </p:grpSpPr>
+      <p:sp>
+        <p:nvSpPr>
+          <p:cNvPr id="20" name="Rectangle 19">
+            <a:extLst>
+              <a:ext uri="{FF2B5EF4-FFF2-40B4-BE49-F238E27FC236}">
+                <a16:creationId xmlns:a16="http://schemas.microsoft.com/office/drawing/2014/main" id="{E27CEA8B-F43A-8744-8828-E17BFCC0EA63}"/>
+              </a:ext>
+            </a:extLst>
+          </p:cNvPr>
+          <p:cNvSpPr/>
+          <p:nvPr/>
+        </p:nvSpPr>
+        <p:spPr>
+          <a:xfrm>
+            <a:off x="682482" y="540662"/>
+            <a:ext cx="11090417" cy="3982351"/>
+          </a:xfrm>
+          <a:prstGeom prst="rect">
+            <a:avLst/>
+          </a:prstGeom>
+          <a:solidFill>
+            <a:schemeClr val="bg1"/>
+          </a:solidFill>
+          <a:ln>
+            <a:solidFill>
+              <a:schemeClr val="bg1"/>
+            </a:solidFill>
+          </a:ln>
+        </p:spPr>
+        <p:style>
+          <a:lnRef idx="2">
+            <a:schemeClr val="accent1">
+              <a:shade val="50000"/>
+            </a:schemeClr>
+          </a:lnRef>
+          <a:fillRef idx="1">
+            <a:schemeClr val="accent1"/>
+          </a:fillRef>
+          <a:effectRef idx="0">
+            <a:schemeClr val="accent1"/>
+          </a:effectRef>
+          <a:fontRef idx="minor">
+            <a:schemeClr val="lt1"/>
+          </a:fontRef>
+        </p:style>
+        <p:txBody>
+          <a:bodyPr rtlCol="0" anchor="ctr"/>
+          <a:lstStyle/>
+          <a:p>
+            <a:pPr algn="ctr"/>
+            <a:endParaRPr lang="en-US"/>
+          </a:p>
+        </p:txBody>
+      </p:sp>
       <p:grpSp>
         <p:nvGrpSpPr>
           <p:cNvPr id="15" name="Group 14">

</xml_diff>

<commit_message>
day 1 R part 14
</commit_message>
<xml_diff>
--- a/Rivanna_Practicums/1.Introduction/Figures/base_figs.pptx
+++ b/Rivanna_Practicums/1.Introduction/Figures/base_figs.pptx
@@ -3321,66 +3321,12 @@
           <a:chExt cx="0" cy="0"/>
         </a:xfrm>
       </p:grpSpPr>
-      <p:sp>
-        <p:nvSpPr>
-          <p:cNvPr id="20" name="Rectangle 19">
-            <a:extLst>
-              <a:ext uri="{FF2B5EF4-FFF2-40B4-BE49-F238E27FC236}">
-                <a16:creationId xmlns:a16="http://schemas.microsoft.com/office/drawing/2014/main" id="{E27CEA8B-F43A-8744-8828-E17BFCC0EA63}"/>
-              </a:ext>
-            </a:extLst>
-          </p:cNvPr>
-          <p:cNvSpPr/>
-          <p:nvPr/>
-        </p:nvSpPr>
-        <p:spPr>
-          <a:xfrm>
-            <a:off x="682482" y="540662"/>
-            <a:ext cx="11090417" cy="3982351"/>
-          </a:xfrm>
-          <a:prstGeom prst="rect">
-            <a:avLst/>
-          </a:prstGeom>
-          <a:solidFill>
-            <a:schemeClr val="bg1"/>
-          </a:solidFill>
-          <a:ln>
-            <a:solidFill>
-              <a:schemeClr val="bg1"/>
-            </a:solidFill>
-          </a:ln>
-        </p:spPr>
-        <p:style>
-          <a:lnRef idx="2">
-            <a:schemeClr val="accent1">
-              <a:shade val="50000"/>
-            </a:schemeClr>
-          </a:lnRef>
-          <a:fillRef idx="1">
-            <a:schemeClr val="accent1"/>
-          </a:fillRef>
-          <a:effectRef idx="0">
-            <a:schemeClr val="accent1"/>
-          </a:effectRef>
-          <a:fontRef idx="minor">
-            <a:schemeClr val="lt1"/>
-          </a:fontRef>
-        </p:style>
-        <p:txBody>
-          <a:bodyPr rtlCol="0" anchor="ctr"/>
-          <a:lstStyle/>
-          <a:p>
-            <a:pPr algn="ctr"/>
-            <a:endParaRPr lang="en-US"/>
-          </a:p>
-        </p:txBody>
-      </p:sp>
       <p:grpSp>
         <p:nvGrpSpPr>
-          <p:cNvPr id="15" name="Group 14">
-            <a:extLst>
-              <a:ext uri="{FF2B5EF4-FFF2-40B4-BE49-F238E27FC236}">
-                <a16:creationId xmlns:a16="http://schemas.microsoft.com/office/drawing/2014/main" id="{94764525-7D06-5F41-955E-EA40668F042A}"/>
+          <p:cNvPr id="21" name="Group 20">
+            <a:extLst>
+              <a:ext uri="{FF2B5EF4-FFF2-40B4-BE49-F238E27FC236}">
+                <a16:creationId xmlns:a16="http://schemas.microsoft.com/office/drawing/2014/main" id="{CE39028E-A404-3749-8D88-0D8977A03A75}"/>
               </a:ext>
             </a:extLst>
           </p:cNvPr>
@@ -3389,407 +3335,482 @@
         </p:nvGrpSpPr>
         <p:grpSpPr>
           <a:xfrm>
-            <a:off x="1047069" y="702129"/>
-            <a:ext cx="10488774" cy="3414083"/>
-            <a:chOff x="442912" y="1061357"/>
-            <a:chExt cx="10488774" cy="3414083"/>
+            <a:off x="682482" y="540662"/>
+            <a:ext cx="11090417" cy="3982351"/>
+            <a:chOff x="682482" y="540662"/>
+            <a:chExt cx="11090417" cy="3982351"/>
           </a:xfrm>
-          <a:solidFill>
-            <a:schemeClr val="bg1"/>
-          </a:solidFill>
         </p:grpSpPr>
         <p:sp>
           <p:nvSpPr>
-            <p:cNvPr id="4" name="TextBox 3">
+            <p:cNvPr id="20" name="Rectangle 19">
               <a:extLst>
                 <a:ext uri="{FF2B5EF4-FFF2-40B4-BE49-F238E27FC236}">
-                  <a16:creationId xmlns:a16="http://schemas.microsoft.com/office/drawing/2014/main" id="{A6A6552B-B0C1-1744-A413-6876AC7D25C0}"/>
+                  <a16:creationId xmlns:a16="http://schemas.microsoft.com/office/drawing/2014/main" id="{E27CEA8B-F43A-8744-8828-E17BFCC0EA63}"/>
                 </a:ext>
               </a:extLst>
             </p:cNvPr>
-            <p:cNvSpPr txBox="1"/>
+            <p:cNvSpPr/>
             <p:nvPr/>
           </p:nvSpPr>
           <p:spPr>
             <a:xfrm>
-              <a:off x="442912" y="2044005"/>
-              <a:ext cx="9273693" cy="1384995"/>
+              <a:off x="682482" y="540662"/>
+              <a:ext cx="11090417" cy="3982351"/>
             </a:xfrm>
             <a:prstGeom prst="rect">
               <a:avLst/>
             </a:prstGeom>
-            <a:grpFill/>
-          </p:spPr>
-          <p:txBody>
-            <a:bodyPr wrap="square" rtlCol="0">
-              <a:spAutoFit/>
-            </a:bodyPr>
-            <a:lstStyle/>
-            <a:p>
-              <a:r>
-                <a:rPr lang="en-US" sz="2800" dirty="0">
-                  <a:latin typeface="Menlo" panose="020B0609030804020204" pitchFamily="49" charset="0"/>
-                  <a:ea typeface="Menlo" panose="020B0609030804020204" pitchFamily="49" charset="0"/>
-                  <a:cs typeface="Menlo" panose="020B0609030804020204" pitchFamily="49" charset="0"/>
-                </a:rPr>
-                <a:t>Iris %&gt;%</a:t>
-              </a:r>
-            </a:p>
-            <a:p>
-              <a:r>
-                <a:rPr lang="en-US" sz="2800" dirty="0" err="1">
-                  <a:latin typeface="Menlo" panose="020B0609030804020204" pitchFamily="49" charset="0"/>
-                  <a:ea typeface="Menlo" panose="020B0609030804020204" pitchFamily="49" charset="0"/>
-                  <a:cs typeface="Menlo" panose="020B0609030804020204" pitchFamily="49" charset="0"/>
-                </a:rPr>
-                <a:t>ggplot</a:t>
-              </a:r>
-              <a:r>
-                <a:rPr lang="en-US" sz="2800" dirty="0">
-                  <a:latin typeface="Menlo" panose="020B0609030804020204" pitchFamily="49" charset="0"/>
-                  <a:ea typeface="Menlo" panose="020B0609030804020204" pitchFamily="49" charset="0"/>
-                  <a:cs typeface="Menlo" panose="020B0609030804020204" pitchFamily="49" charset="0"/>
-                </a:rPr>
-                <a:t>( </a:t>
-              </a:r>
-              <a:r>
-                <a:rPr lang="en-US" sz="2800" dirty="0" err="1">
-                  <a:latin typeface="Menlo" panose="020B0609030804020204" pitchFamily="49" charset="0"/>
-                  <a:ea typeface="Menlo" panose="020B0609030804020204" pitchFamily="49" charset="0"/>
-                  <a:cs typeface="Menlo" panose="020B0609030804020204" pitchFamily="49" charset="0"/>
-                </a:rPr>
-                <a:t>aes</a:t>
-              </a:r>
-              <a:r>
-                <a:rPr lang="en-US" sz="2800" dirty="0">
-                  <a:latin typeface="Menlo" panose="020B0609030804020204" pitchFamily="49" charset="0"/>
-                  <a:ea typeface="Menlo" panose="020B0609030804020204" pitchFamily="49" charset="0"/>
-                  <a:cs typeface="Menlo" panose="020B0609030804020204" pitchFamily="49" charset="0"/>
-                </a:rPr>
-                <a:t>( x= </a:t>
-              </a:r>
-              <a:r>
-                <a:rPr lang="en-US" sz="2800" dirty="0" err="1">
-                  <a:latin typeface="Menlo" panose="020B0609030804020204" pitchFamily="49" charset="0"/>
-                  <a:ea typeface="Menlo" panose="020B0609030804020204" pitchFamily="49" charset="0"/>
-                  <a:cs typeface="Menlo" panose="020B0609030804020204" pitchFamily="49" charset="0"/>
-                </a:rPr>
-                <a:t>isFavorite</a:t>
-              </a:r>
-              <a:r>
-                <a:rPr lang="en-US" sz="2800" dirty="0">
-                  <a:latin typeface="Menlo" panose="020B0609030804020204" pitchFamily="49" charset="0"/>
-                  <a:ea typeface="Menlo" panose="020B0609030804020204" pitchFamily="49" charset="0"/>
-                  <a:cs typeface="Menlo" panose="020B0609030804020204" pitchFamily="49" charset="0"/>
-                </a:rPr>
-                <a:t>, y= MEAN  ) ) +</a:t>
-              </a:r>
-            </a:p>
-            <a:p>
-              <a:r>
-                <a:rPr lang="en-US" sz="2800" dirty="0" err="1">
-                  <a:latin typeface="Menlo" panose="020B0609030804020204" pitchFamily="49" charset="0"/>
-                  <a:ea typeface="Menlo" panose="020B0609030804020204" pitchFamily="49" charset="0"/>
-                  <a:cs typeface="Menlo" panose="020B0609030804020204" pitchFamily="49" charset="0"/>
-                </a:rPr>
-                <a:t>geom_point</a:t>
-              </a:r>
-              <a:r>
-                <a:rPr lang="en-US" sz="2800" dirty="0">
-                  <a:latin typeface="Menlo" panose="020B0609030804020204" pitchFamily="49" charset="0"/>
-                  <a:ea typeface="Menlo" panose="020B0609030804020204" pitchFamily="49" charset="0"/>
-                  <a:cs typeface="Menlo" panose="020B0609030804020204" pitchFamily="49" charset="0"/>
-                </a:rPr>
-                <a:t>(size = 3)</a:t>
-              </a:r>
-            </a:p>
-          </p:txBody>
-        </p:sp>
-        <p:sp>
-          <p:nvSpPr>
-            <p:cNvPr id="5" name="TextBox 4">
-              <a:extLst>
-                <a:ext uri="{FF2B5EF4-FFF2-40B4-BE49-F238E27FC236}">
-                  <a16:creationId xmlns:a16="http://schemas.microsoft.com/office/drawing/2014/main" id="{DFA4E5CA-34A4-194C-A1DD-7B76A0CAD082}"/>
-                </a:ext>
-              </a:extLst>
-            </p:cNvPr>
-            <p:cNvSpPr txBox="1"/>
-            <p:nvPr/>
-          </p:nvSpPr>
-          <p:spPr>
-            <a:xfrm>
-              <a:off x="1371600" y="1061357"/>
-              <a:ext cx="1257300" cy="523220"/>
-            </a:xfrm>
-            <a:prstGeom prst="rect">
-              <a:avLst/>
-            </a:prstGeom>
-            <a:grpFill/>
-          </p:spPr>
-          <p:txBody>
-            <a:bodyPr wrap="square" rtlCol="0">
-              <a:spAutoFit/>
-            </a:bodyPr>
-            <a:lstStyle/>
-            <a:p>
-              <a:r>
-                <a:rPr lang="en-US" sz="2800" b="1" dirty="0">
-                  <a:solidFill>
-                    <a:srgbClr val="C00000"/>
-                  </a:solidFill>
-                </a:rPr>
-                <a:t>data</a:t>
-              </a:r>
-            </a:p>
-          </p:txBody>
-        </p:sp>
-        <p:cxnSp>
-          <p:nvCxnSpPr>
-            <p:cNvPr id="7" name="Straight Arrow Connector 6">
-              <a:extLst>
-                <a:ext uri="{FF2B5EF4-FFF2-40B4-BE49-F238E27FC236}">
-                  <a16:creationId xmlns:a16="http://schemas.microsoft.com/office/drawing/2014/main" id="{E2037A4D-AC95-6544-A005-1AE7A32A3BA6}"/>
-                </a:ext>
-              </a:extLst>
-            </p:cNvPr>
-            <p:cNvCxnSpPr>
-              <a:cxnSpLocks/>
-              <a:stCxn id="5" idx="2"/>
-            </p:cNvCxnSpPr>
-            <p:nvPr/>
-          </p:nvCxnSpPr>
-          <p:spPr>
-            <a:xfrm flipH="1">
-              <a:off x="1371600" y="1584577"/>
-              <a:ext cx="628650" cy="459428"/>
-            </a:xfrm>
-            <a:prstGeom prst="straightConnector1">
-              <a:avLst/>
-            </a:prstGeom>
-            <a:grpFill/>
-            <a:ln w="57150">
-              <a:tailEnd type="triangle"/>
+            <a:solidFill>
+              <a:schemeClr val="bg1"/>
+            </a:solidFill>
+            <a:ln>
+              <a:solidFill>
+                <a:schemeClr val="bg1"/>
+              </a:solidFill>
             </a:ln>
           </p:spPr>
           <p:style>
-            <a:lnRef idx="1">
-              <a:schemeClr val="accent1"/>
+            <a:lnRef idx="2">
+              <a:schemeClr val="accent1">
+                <a:shade val="50000"/>
+              </a:schemeClr>
             </a:lnRef>
-            <a:fillRef idx="0">
+            <a:fillRef idx="1">
               <a:schemeClr val="accent1"/>
             </a:fillRef>
             <a:effectRef idx="0">
               <a:schemeClr val="accent1"/>
             </a:effectRef>
             <a:fontRef idx="minor">
-              <a:schemeClr val="tx1"/>
+              <a:schemeClr val="lt1"/>
             </a:fontRef>
           </p:style>
-        </p:cxnSp>
-        <p:sp>
-          <p:nvSpPr>
-            <p:cNvPr id="8" name="TextBox 7">
+          <p:txBody>
+            <a:bodyPr rtlCol="0" anchor="ctr"/>
+            <a:lstStyle/>
+            <a:p>
+              <a:pPr algn="ctr"/>
+              <a:endParaRPr lang="en-US"/>
+            </a:p>
+          </p:txBody>
+        </p:sp>
+        <p:grpSp>
+          <p:nvGrpSpPr>
+            <p:cNvPr id="15" name="Group 14">
               <a:extLst>
                 <a:ext uri="{FF2B5EF4-FFF2-40B4-BE49-F238E27FC236}">
-                  <a16:creationId xmlns:a16="http://schemas.microsoft.com/office/drawing/2014/main" id="{05A629D8-7A76-FD4F-BC52-DF030CB37B7A}"/>
+                  <a16:creationId xmlns:a16="http://schemas.microsoft.com/office/drawing/2014/main" id="{94764525-7D06-5F41-955E-EA40668F042A}"/>
                 </a:ext>
               </a:extLst>
             </p:cNvPr>
-            <p:cNvSpPr txBox="1"/>
+            <p:cNvGrpSpPr/>
             <p:nvPr/>
-          </p:nvSpPr>
-          <p:spPr>
+          </p:nvGrpSpPr>
+          <p:grpSpPr>
             <a:xfrm>
-              <a:off x="2757999" y="1492245"/>
-              <a:ext cx="2733844" cy="523220"/>
+              <a:off x="1047069" y="702129"/>
+              <a:ext cx="10488774" cy="3414083"/>
+              <a:chOff x="442912" y="1061357"/>
+              <a:chExt cx="10488774" cy="3414083"/>
             </a:xfrm>
-            <a:prstGeom prst="rect">
-              <a:avLst/>
-            </a:prstGeom>
-            <a:grpFill/>
-          </p:spPr>
-          <p:txBody>
-            <a:bodyPr wrap="square" rtlCol="0">
-              <a:spAutoFit/>
-            </a:bodyPr>
-            <a:lstStyle/>
-            <a:p>
-              <a:r>
-                <a:rPr lang="en-US" sz="2800" b="1" dirty="0">
-                  <a:solidFill>
-                    <a:srgbClr val="C00000"/>
-                  </a:solidFill>
-                </a:rPr>
-                <a:t>Aesthetic map</a:t>
-              </a:r>
-            </a:p>
-          </p:txBody>
-        </p:sp>
-        <p:cxnSp>
-          <p:nvCxnSpPr>
-            <p:cNvPr id="9" name="Straight Arrow Connector 8">
-              <a:extLst>
-                <a:ext uri="{FF2B5EF4-FFF2-40B4-BE49-F238E27FC236}">
-                  <a16:creationId xmlns:a16="http://schemas.microsoft.com/office/drawing/2014/main" id="{B2422E2A-052A-764C-B06B-4785C64E5324}"/>
-                </a:ext>
-              </a:extLst>
-            </p:cNvPr>
-            <p:cNvCxnSpPr>
-              <a:cxnSpLocks/>
-              <a:stCxn id="8" idx="2"/>
-            </p:cNvCxnSpPr>
-            <p:nvPr/>
-          </p:nvCxnSpPr>
-          <p:spPr>
-            <a:xfrm flipH="1">
-              <a:off x="2758009" y="2015465"/>
-              <a:ext cx="1366912" cy="459428"/>
-            </a:xfrm>
-            <a:prstGeom prst="straightConnector1">
-              <a:avLst/>
-            </a:prstGeom>
-            <a:grpFill/>
-            <a:ln w="57150">
-              <a:tailEnd type="triangle"/>
-            </a:ln>
-          </p:spPr>
-          <p:style>
-            <a:lnRef idx="1">
-              <a:schemeClr val="accent1"/>
-            </a:lnRef>
-            <a:fillRef idx="0">
-              <a:schemeClr val="accent1"/>
-            </a:fillRef>
-            <a:effectRef idx="0">
-              <a:schemeClr val="accent1"/>
-            </a:effectRef>
-            <a:fontRef idx="minor">
-              <a:schemeClr val="tx1"/>
-            </a:fontRef>
-          </p:style>
-        </p:cxnSp>
-        <p:sp>
-          <p:nvSpPr>
-            <p:cNvPr id="10" name="TextBox 9">
-              <a:extLst>
-                <a:ext uri="{FF2B5EF4-FFF2-40B4-BE49-F238E27FC236}">
-                  <a16:creationId xmlns:a16="http://schemas.microsoft.com/office/drawing/2014/main" id="{64B7CFD5-A58A-1248-A38B-46D5818809C1}"/>
-                </a:ext>
-              </a:extLst>
-            </p:cNvPr>
-            <p:cNvSpPr txBox="1"/>
-            <p:nvPr/>
-          </p:nvSpPr>
-          <p:spPr>
-            <a:xfrm>
-              <a:off x="2092037" y="3952220"/>
-              <a:ext cx="1826819" cy="523220"/>
-            </a:xfrm>
-            <a:prstGeom prst="rect">
-              <a:avLst/>
-            </a:prstGeom>
-            <a:grpFill/>
-          </p:spPr>
-          <p:txBody>
-            <a:bodyPr wrap="square" rtlCol="0">
-              <a:spAutoFit/>
-            </a:bodyPr>
-            <a:lstStyle/>
-            <a:p>
-              <a:r>
-                <a:rPr lang="en-US" sz="2800" b="1" dirty="0">
-                  <a:solidFill>
-                    <a:srgbClr val="C00000"/>
-                  </a:solidFill>
-                </a:rPr>
-                <a:t>Elements</a:t>
-              </a:r>
-            </a:p>
-          </p:txBody>
-        </p:sp>
-        <p:cxnSp>
-          <p:nvCxnSpPr>
-            <p:cNvPr id="11" name="Straight Arrow Connector 10">
-              <a:extLst>
-                <a:ext uri="{FF2B5EF4-FFF2-40B4-BE49-F238E27FC236}">
-                  <a16:creationId xmlns:a16="http://schemas.microsoft.com/office/drawing/2014/main" id="{F637C5E2-5837-6844-91DE-EF51AB039EF0}"/>
-                </a:ext>
-              </a:extLst>
-            </p:cNvPr>
-            <p:cNvCxnSpPr>
-              <a:cxnSpLocks/>
-              <a:stCxn id="10" idx="0"/>
-            </p:cNvCxnSpPr>
-            <p:nvPr/>
-          </p:nvCxnSpPr>
-          <p:spPr>
-            <a:xfrm flipH="1" flipV="1">
-              <a:off x="1797137" y="3429000"/>
-              <a:ext cx="1208310" cy="523220"/>
-            </a:xfrm>
-            <a:prstGeom prst="straightConnector1">
-              <a:avLst/>
-            </a:prstGeom>
-            <a:grpFill/>
-            <a:ln w="57150">
-              <a:tailEnd type="triangle"/>
-            </a:ln>
-          </p:spPr>
-          <p:style>
-            <a:lnRef idx="1">
-              <a:schemeClr val="accent1"/>
-            </a:lnRef>
-            <a:fillRef idx="0">
-              <a:schemeClr val="accent1"/>
-            </a:fillRef>
-            <a:effectRef idx="0">
-              <a:schemeClr val="accent1"/>
-            </a:effectRef>
-            <a:fontRef idx="minor">
-              <a:schemeClr val="tx1"/>
-            </a:fontRef>
-          </p:style>
-        </p:cxnSp>
-        <p:sp>
-          <p:nvSpPr>
-            <p:cNvPr id="14" name="TextBox 13">
-              <a:extLst>
-                <a:ext uri="{FF2B5EF4-FFF2-40B4-BE49-F238E27FC236}">
-                  <a16:creationId xmlns:a16="http://schemas.microsoft.com/office/drawing/2014/main" id="{E0A2DD6A-7383-B045-99C0-2B3177D35F24}"/>
-                </a:ext>
-              </a:extLst>
-            </p:cNvPr>
-            <p:cNvSpPr txBox="1"/>
-            <p:nvPr/>
-          </p:nvSpPr>
-          <p:spPr>
-            <a:xfrm>
-              <a:off x="8501524" y="2886393"/>
-              <a:ext cx="2430162" cy="1384995"/>
-            </a:xfrm>
-            <a:prstGeom prst="rect">
-              <a:avLst/>
-            </a:prstGeom>
-            <a:grpFill/>
-          </p:spPr>
-          <p:txBody>
-            <a:bodyPr wrap="square" rtlCol="0">
-              <a:spAutoFit/>
-            </a:bodyPr>
-            <a:lstStyle/>
-            <a:p>
-              <a:r>
-                <a:rPr lang="en-US" sz="2800" b="1" dirty="0">
-                  <a:solidFill>
-                    <a:srgbClr val="C00000"/>
-                  </a:solidFill>
-                </a:rPr>
-                <a:t>Elements are added with a + sign</a:t>
-              </a:r>
-            </a:p>
-          </p:txBody>
-        </p:sp>
+            <a:solidFill>
+              <a:schemeClr val="bg1"/>
+            </a:solidFill>
+          </p:grpSpPr>
+          <p:sp>
+            <p:nvSpPr>
+              <p:cNvPr id="4" name="TextBox 3">
+                <a:extLst>
+                  <a:ext uri="{FF2B5EF4-FFF2-40B4-BE49-F238E27FC236}">
+                    <a16:creationId xmlns:a16="http://schemas.microsoft.com/office/drawing/2014/main" id="{A6A6552B-B0C1-1744-A413-6876AC7D25C0}"/>
+                  </a:ext>
+                </a:extLst>
+              </p:cNvPr>
+              <p:cNvSpPr txBox="1"/>
+              <p:nvPr/>
+            </p:nvSpPr>
+            <p:spPr>
+              <a:xfrm>
+                <a:off x="442912" y="2044005"/>
+                <a:ext cx="9273693" cy="1384995"/>
+              </a:xfrm>
+              <a:prstGeom prst="rect">
+                <a:avLst/>
+              </a:prstGeom>
+              <a:grpFill/>
+            </p:spPr>
+            <p:txBody>
+              <a:bodyPr wrap="square" rtlCol="0">
+                <a:spAutoFit/>
+              </a:bodyPr>
+              <a:lstStyle/>
+              <a:p>
+                <a:r>
+                  <a:rPr lang="en-US" sz="2800" dirty="0">
+                    <a:latin typeface="Menlo" panose="020B0609030804020204" pitchFamily="49" charset="0"/>
+                    <a:ea typeface="Menlo" panose="020B0609030804020204" pitchFamily="49" charset="0"/>
+                    <a:cs typeface="Menlo" panose="020B0609030804020204" pitchFamily="49" charset="0"/>
+                  </a:rPr>
+                  <a:t>Iris %&gt;%</a:t>
+                </a:r>
+              </a:p>
+              <a:p>
+                <a:r>
+                  <a:rPr lang="en-US" sz="2800" dirty="0" err="1">
+                    <a:latin typeface="Menlo" panose="020B0609030804020204" pitchFamily="49" charset="0"/>
+                    <a:ea typeface="Menlo" panose="020B0609030804020204" pitchFamily="49" charset="0"/>
+                    <a:cs typeface="Menlo" panose="020B0609030804020204" pitchFamily="49" charset="0"/>
+                  </a:rPr>
+                  <a:t>ggplot</a:t>
+                </a:r>
+                <a:r>
+                  <a:rPr lang="en-US" sz="2800" dirty="0">
+                    <a:latin typeface="Menlo" panose="020B0609030804020204" pitchFamily="49" charset="0"/>
+                    <a:ea typeface="Menlo" panose="020B0609030804020204" pitchFamily="49" charset="0"/>
+                    <a:cs typeface="Menlo" panose="020B0609030804020204" pitchFamily="49" charset="0"/>
+                  </a:rPr>
+                  <a:t>( </a:t>
+                </a:r>
+                <a:r>
+                  <a:rPr lang="en-US" sz="2800" dirty="0" err="1">
+                    <a:latin typeface="Menlo" panose="020B0609030804020204" pitchFamily="49" charset="0"/>
+                    <a:ea typeface="Menlo" panose="020B0609030804020204" pitchFamily="49" charset="0"/>
+                    <a:cs typeface="Menlo" panose="020B0609030804020204" pitchFamily="49" charset="0"/>
+                  </a:rPr>
+                  <a:t>aes</a:t>
+                </a:r>
+                <a:r>
+                  <a:rPr lang="en-US" sz="2800" dirty="0">
+                    <a:latin typeface="Menlo" panose="020B0609030804020204" pitchFamily="49" charset="0"/>
+                    <a:ea typeface="Menlo" panose="020B0609030804020204" pitchFamily="49" charset="0"/>
+                    <a:cs typeface="Menlo" panose="020B0609030804020204" pitchFamily="49" charset="0"/>
+                  </a:rPr>
+                  <a:t>( x= </a:t>
+                </a:r>
+                <a:r>
+                  <a:rPr lang="en-US" sz="2800" dirty="0" err="1">
+                    <a:latin typeface="Menlo" panose="020B0609030804020204" pitchFamily="49" charset="0"/>
+                    <a:ea typeface="Menlo" panose="020B0609030804020204" pitchFamily="49" charset="0"/>
+                    <a:cs typeface="Menlo" panose="020B0609030804020204" pitchFamily="49" charset="0"/>
+                  </a:rPr>
+                  <a:t>isFavorite</a:t>
+                </a:r>
+                <a:r>
+                  <a:rPr lang="en-US" sz="2800" dirty="0">
+                    <a:latin typeface="Menlo" panose="020B0609030804020204" pitchFamily="49" charset="0"/>
+                    <a:ea typeface="Menlo" panose="020B0609030804020204" pitchFamily="49" charset="0"/>
+                    <a:cs typeface="Menlo" panose="020B0609030804020204" pitchFamily="49" charset="0"/>
+                  </a:rPr>
+                  <a:t>, y= MEAN  ) ) +</a:t>
+                </a:r>
+              </a:p>
+              <a:p>
+                <a:r>
+                  <a:rPr lang="en-US" sz="2800" dirty="0" err="1">
+                    <a:latin typeface="Menlo" panose="020B0609030804020204" pitchFamily="49" charset="0"/>
+                    <a:ea typeface="Menlo" panose="020B0609030804020204" pitchFamily="49" charset="0"/>
+                    <a:cs typeface="Menlo" panose="020B0609030804020204" pitchFamily="49" charset="0"/>
+                  </a:rPr>
+                  <a:t>geom_point</a:t>
+                </a:r>
+                <a:r>
+                  <a:rPr lang="en-US" sz="2800" dirty="0">
+                    <a:latin typeface="Menlo" panose="020B0609030804020204" pitchFamily="49" charset="0"/>
+                    <a:ea typeface="Menlo" panose="020B0609030804020204" pitchFamily="49" charset="0"/>
+                    <a:cs typeface="Menlo" panose="020B0609030804020204" pitchFamily="49" charset="0"/>
+                  </a:rPr>
+                  <a:t>(size = 3)</a:t>
+                </a:r>
+              </a:p>
+            </p:txBody>
+          </p:sp>
+          <p:sp>
+            <p:nvSpPr>
+              <p:cNvPr id="5" name="TextBox 4">
+                <a:extLst>
+                  <a:ext uri="{FF2B5EF4-FFF2-40B4-BE49-F238E27FC236}">
+                    <a16:creationId xmlns:a16="http://schemas.microsoft.com/office/drawing/2014/main" id="{DFA4E5CA-34A4-194C-A1DD-7B76A0CAD082}"/>
+                  </a:ext>
+                </a:extLst>
+              </p:cNvPr>
+              <p:cNvSpPr txBox="1"/>
+              <p:nvPr/>
+            </p:nvSpPr>
+            <p:spPr>
+              <a:xfrm>
+                <a:off x="1371600" y="1061357"/>
+                <a:ext cx="1257300" cy="523220"/>
+              </a:xfrm>
+              <a:prstGeom prst="rect">
+                <a:avLst/>
+              </a:prstGeom>
+              <a:grpFill/>
+            </p:spPr>
+            <p:txBody>
+              <a:bodyPr wrap="square" rtlCol="0">
+                <a:spAutoFit/>
+              </a:bodyPr>
+              <a:lstStyle/>
+              <a:p>
+                <a:r>
+                  <a:rPr lang="en-US" sz="2800" b="1" dirty="0">
+                    <a:solidFill>
+                      <a:srgbClr val="C00000"/>
+                    </a:solidFill>
+                  </a:rPr>
+                  <a:t>data</a:t>
+                </a:r>
+              </a:p>
+            </p:txBody>
+          </p:sp>
+          <p:cxnSp>
+            <p:nvCxnSpPr>
+              <p:cNvPr id="7" name="Straight Arrow Connector 6">
+                <a:extLst>
+                  <a:ext uri="{FF2B5EF4-FFF2-40B4-BE49-F238E27FC236}">
+                    <a16:creationId xmlns:a16="http://schemas.microsoft.com/office/drawing/2014/main" id="{E2037A4D-AC95-6544-A005-1AE7A32A3BA6}"/>
+                  </a:ext>
+                </a:extLst>
+              </p:cNvPr>
+              <p:cNvCxnSpPr>
+                <a:cxnSpLocks/>
+                <a:stCxn id="5" idx="2"/>
+              </p:cNvCxnSpPr>
+              <p:nvPr/>
+            </p:nvCxnSpPr>
+            <p:spPr>
+              <a:xfrm flipH="1">
+                <a:off x="1371600" y="1584577"/>
+                <a:ext cx="628650" cy="459428"/>
+              </a:xfrm>
+              <a:prstGeom prst="straightConnector1">
+                <a:avLst/>
+              </a:prstGeom>
+              <a:grpFill/>
+              <a:ln w="57150">
+                <a:tailEnd type="triangle"/>
+              </a:ln>
+            </p:spPr>
+            <p:style>
+              <a:lnRef idx="1">
+                <a:schemeClr val="accent1"/>
+              </a:lnRef>
+              <a:fillRef idx="0">
+                <a:schemeClr val="accent1"/>
+              </a:fillRef>
+              <a:effectRef idx="0">
+                <a:schemeClr val="accent1"/>
+              </a:effectRef>
+              <a:fontRef idx="minor">
+                <a:schemeClr val="tx1"/>
+              </a:fontRef>
+            </p:style>
+          </p:cxnSp>
+          <p:sp>
+            <p:nvSpPr>
+              <p:cNvPr id="8" name="TextBox 7">
+                <a:extLst>
+                  <a:ext uri="{FF2B5EF4-FFF2-40B4-BE49-F238E27FC236}">
+                    <a16:creationId xmlns:a16="http://schemas.microsoft.com/office/drawing/2014/main" id="{05A629D8-7A76-FD4F-BC52-DF030CB37B7A}"/>
+                  </a:ext>
+                </a:extLst>
+              </p:cNvPr>
+              <p:cNvSpPr txBox="1"/>
+              <p:nvPr/>
+            </p:nvSpPr>
+            <p:spPr>
+              <a:xfrm>
+                <a:off x="2757999" y="1492245"/>
+                <a:ext cx="2733844" cy="523220"/>
+              </a:xfrm>
+              <a:prstGeom prst="rect">
+                <a:avLst/>
+              </a:prstGeom>
+              <a:grpFill/>
+            </p:spPr>
+            <p:txBody>
+              <a:bodyPr wrap="square" rtlCol="0">
+                <a:spAutoFit/>
+              </a:bodyPr>
+              <a:lstStyle/>
+              <a:p>
+                <a:r>
+                  <a:rPr lang="en-US" sz="2800" b="1" dirty="0">
+                    <a:solidFill>
+                      <a:srgbClr val="C00000"/>
+                    </a:solidFill>
+                  </a:rPr>
+                  <a:t>Aesthetic map</a:t>
+                </a:r>
+              </a:p>
+            </p:txBody>
+          </p:sp>
+          <p:cxnSp>
+            <p:nvCxnSpPr>
+              <p:cNvPr id="9" name="Straight Arrow Connector 8">
+                <a:extLst>
+                  <a:ext uri="{FF2B5EF4-FFF2-40B4-BE49-F238E27FC236}">
+                    <a16:creationId xmlns:a16="http://schemas.microsoft.com/office/drawing/2014/main" id="{B2422E2A-052A-764C-B06B-4785C64E5324}"/>
+                  </a:ext>
+                </a:extLst>
+              </p:cNvPr>
+              <p:cNvCxnSpPr>
+                <a:cxnSpLocks/>
+                <a:stCxn id="8" idx="2"/>
+              </p:cNvCxnSpPr>
+              <p:nvPr/>
+            </p:nvCxnSpPr>
+            <p:spPr>
+              <a:xfrm flipH="1">
+                <a:off x="2758009" y="2015465"/>
+                <a:ext cx="1366912" cy="459428"/>
+              </a:xfrm>
+              <a:prstGeom prst="straightConnector1">
+                <a:avLst/>
+              </a:prstGeom>
+              <a:grpFill/>
+              <a:ln w="57150">
+                <a:tailEnd type="triangle"/>
+              </a:ln>
+            </p:spPr>
+            <p:style>
+              <a:lnRef idx="1">
+                <a:schemeClr val="accent1"/>
+              </a:lnRef>
+              <a:fillRef idx="0">
+                <a:schemeClr val="accent1"/>
+              </a:fillRef>
+              <a:effectRef idx="0">
+                <a:schemeClr val="accent1"/>
+              </a:effectRef>
+              <a:fontRef idx="minor">
+                <a:schemeClr val="tx1"/>
+              </a:fontRef>
+            </p:style>
+          </p:cxnSp>
+          <p:sp>
+            <p:nvSpPr>
+              <p:cNvPr id="10" name="TextBox 9">
+                <a:extLst>
+                  <a:ext uri="{FF2B5EF4-FFF2-40B4-BE49-F238E27FC236}">
+                    <a16:creationId xmlns:a16="http://schemas.microsoft.com/office/drawing/2014/main" id="{64B7CFD5-A58A-1248-A38B-46D5818809C1}"/>
+                  </a:ext>
+                </a:extLst>
+              </p:cNvPr>
+              <p:cNvSpPr txBox="1"/>
+              <p:nvPr/>
+            </p:nvSpPr>
+            <p:spPr>
+              <a:xfrm>
+                <a:off x="2092037" y="3952220"/>
+                <a:ext cx="1826819" cy="523220"/>
+              </a:xfrm>
+              <a:prstGeom prst="rect">
+                <a:avLst/>
+              </a:prstGeom>
+              <a:grpFill/>
+            </p:spPr>
+            <p:txBody>
+              <a:bodyPr wrap="square" rtlCol="0">
+                <a:spAutoFit/>
+              </a:bodyPr>
+              <a:lstStyle/>
+              <a:p>
+                <a:r>
+                  <a:rPr lang="en-US" sz="2800" b="1" dirty="0">
+                    <a:solidFill>
+                      <a:srgbClr val="C00000"/>
+                    </a:solidFill>
+                  </a:rPr>
+                  <a:t>Elements</a:t>
+                </a:r>
+              </a:p>
+            </p:txBody>
+          </p:sp>
+          <p:cxnSp>
+            <p:nvCxnSpPr>
+              <p:cNvPr id="11" name="Straight Arrow Connector 10">
+                <a:extLst>
+                  <a:ext uri="{FF2B5EF4-FFF2-40B4-BE49-F238E27FC236}">
+                    <a16:creationId xmlns:a16="http://schemas.microsoft.com/office/drawing/2014/main" id="{F637C5E2-5837-6844-91DE-EF51AB039EF0}"/>
+                  </a:ext>
+                </a:extLst>
+              </p:cNvPr>
+              <p:cNvCxnSpPr>
+                <a:cxnSpLocks/>
+                <a:stCxn id="10" idx="0"/>
+              </p:cNvCxnSpPr>
+              <p:nvPr/>
+            </p:nvCxnSpPr>
+            <p:spPr>
+              <a:xfrm flipH="1" flipV="1">
+                <a:off x="1797137" y="3429000"/>
+                <a:ext cx="1208310" cy="523220"/>
+              </a:xfrm>
+              <a:prstGeom prst="straightConnector1">
+                <a:avLst/>
+              </a:prstGeom>
+              <a:grpFill/>
+              <a:ln w="57150">
+                <a:tailEnd type="triangle"/>
+              </a:ln>
+            </p:spPr>
+            <p:style>
+              <a:lnRef idx="1">
+                <a:schemeClr val="accent1"/>
+              </a:lnRef>
+              <a:fillRef idx="0">
+                <a:schemeClr val="accent1"/>
+              </a:fillRef>
+              <a:effectRef idx="0">
+                <a:schemeClr val="accent1"/>
+              </a:effectRef>
+              <a:fontRef idx="minor">
+                <a:schemeClr val="tx1"/>
+              </a:fontRef>
+            </p:style>
+          </p:cxnSp>
+          <p:sp>
+            <p:nvSpPr>
+              <p:cNvPr id="14" name="TextBox 13">
+                <a:extLst>
+                  <a:ext uri="{FF2B5EF4-FFF2-40B4-BE49-F238E27FC236}">
+                    <a16:creationId xmlns:a16="http://schemas.microsoft.com/office/drawing/2014/main" id="{E0A2DD6A-7383-B045-99C0-2B3177D35F24}"/>
+                  </a:ext>
+                </a:extLst>
+              </p:cNvPr>
+              <p:cNvSpPr txBox="1"/>
+              <p:nvPr/>
+            </p:nvSpPr>
+            <p:spPr>
+              <a:xfrm>
+                <a:off x="8501524" y="2886393"/>
+                <a:ext cx="2430162" cy="1384995"/>
+              </a:xfrm>
+              <a:prstGeom prst="rect">
+                <a:avLst/>
+              </a:prstGeom>
+              <a:grpFill/>
+            </p:spPr>
+            <p:txBody>
+              <a:bodyPr wrap="square" rtlCol="0">
+                <a:spAutoFit/>
+              </a:bodyPr>
+              <a:lstStyle/>
+              <a:p>
+                <a:r>
+                  <a:rPr lang="en-US" sz="2800" b="1" dirty="0">
+                    <a:solidFill>
+                      <a:srgbClr val="C00000"/>
+                    </a:solidFill>
+                  </a:rPr>
+                  <a:t>Elements are added with a + sign</a:t>
+                </a:r>
+              </a:p>
+            </p:txBody>
+          </p:sp>
+        </p:grpSp>
       </p:grpSp>
     </p:spTree>
     <p:extLst>

</xml_diff>

<commit_message>
day 1 R part 21
</commit_message>
<xml_diff>
--- a/Rivanna_Practicums/1.Introduction/Figures/base_figs.pptx
+++ b/Rivanna_Practicums/1.Introduction/Figures/base_figs.pptx
@@ -104,6 +104,11 @@
       </a:defRPr>
     </a:lvl9pPr>
   </p:defaultTextStyle>
+  <p:extLst>
+    <p:ext uri="{EFAFB233-063F-42B5-8137-9DF3F51BA10A}">
+      <p15:sldGuideLst xmlns:p15="http://schemas.microsoft.com/office/powerpoint/2012/main"/>
+    </p:ext>
+  </p:extLst>
 </p:presentation>
 </file>
 
@@ -3447,12 +3452,20 @@
               <a:lstStyle/>
               <a:p>
                 <a:r>
+                  <a:rPr lang="en-US" sz="2800" dirty="0" err="1">
+                    <a:latin typeface="Menlo" panose="020B0609030804020204" pitchFamily="49" charset="0"/>
+                    <a:ea typeface="Menlo" panose="020B0609030804020204" pitchFamily="49" charset="0"/>
+                    <a:cs typeface="Menlo" panose="020B0609030804020204" pitchFamily="49" charset="0"/>
+                  </a:rPr>
+                  <a:t>MyFavoriteIrisFlowers</a:t>
+                </a:r>
+                <a:r>
                   <a:rPr lang="en-US" sz="2800" dirty="0">
                     <a:latin typeface="Menlo" panose="020B0609030804020204" pitchFamily="49" charset="0"/>
                     <a:ea typeface="Menlo" panose="020B0609030804020204" pitchFamily="49" charset="0"/>
                     <a:cs typeface="Menlo" panose="020B0609030804020204" pitchFamily="49" charset="0"/>
                   </a:rPr>
-                  <a:t>Iris %&gt;%</a:t>
+                  <a:t> %&gt;%</a:t>
                 </a:r>
               </a:p>
               <a:p>
@@ -3621,7 +3634,7 @@
             </p:nvSpPr>
             <p:spPr>
               <a:xfrm>
-                <a:off x="2757999" y="1492245"/>
+                <a:off x="6223380" y="1450655"/>
                 <a:ext cx="2733844" cy="523220"/>
               </a:xfrm>
               <a:prstGeom prst="rect">
@@ -3663,7 +3676,7 @@
             </p:nvCxnSpPr>
             <p:spPr>
               <a:xfrm flipH="1">
-                <a:off x="2758009" y="2015465"/>
+                <a:off x="6223390" y="1973875"/>
                 <a:ext cx="1366912" cy="459428"/>
               </a:xfrm>
               <a:prstGeom prst="straightConnector1">

</xml_diff>

<commit_message>
day 1 class prep 2
</commit_message>
<xml_diff>
--- a/Rivanna_Practicums/1.Introduction/Figures/base_figs.pptx
+++ b/Rivanna_Practicums/1.Introduction/Figures/base_figs.pptx
@@ -6,6 +6,7 @@
   </p:sldMasterIdLst>
   <p:sldIdLst>
     <p:sldId id="256" r:id="rId2"/>
+    <p:sldId id="257" r:id="rId3"/>
   </p:sldIdLst>
   <p:sldSz cx="12192000" cy="6858000"/>
   <p:notesSz cx="6858000" cy="9144000"/>
@@ -259,7 +260,7 @@
           <a:p>
             <a:fld id="{FB69B2FA-2205-7E4B-BB99-6DB8770A7B65}" type="datetimeFigureOut">
               <a:rPr lang="en-US" smtClean="0"/>
-              <a:t>11/11/21</a:t>
+              <a:t>11/12/21</a:t>
             </a:fld>
             <a:endParaRPr lang="en-US"/>
           </a:p>
@@ -457,7 +458,7 @@
           <a:p>
             <a:fld id="{FB69B2FA-2205-7E4B-BB99-6DB8770A7B65}" type="datetimeFigureOut">
               <a:rPr lang="en-US" smtClean="0"/>
-              <a:t>11/11/21</a:t>
+              <a:t>11/12/21</a:t>
             </a:fld>
             <a:endParaRPr lang="en-US"/>
           </a:p>
@@ -665,7 +666,7 @@
           <a:p>
             <a:fld id="{FB69B2FA-2205-7E4B-BB99-6DB8770A7B65}" type="datetimeFigureOut">
               <a:rPr lang="en-US" smtClean="0"/>
-              <a:t>11/11/21</a:t>
+              <a:t>11/12/21</a:t>
             </a:fld>
             <a:endParaRPr lang="en-US"/>
           </a:p>
@@ -863,7 +864,7 @@
           <a:p>
             <a:fld id="{FB69B2FA-2205-7E4B-BB99-6DB8770A7B65}" type="datetimeFigureOut">
               <a:rPr lang="en-US" smtClean="0"/>
-              <a:t>11/11/21</a:t>
+              <a:t>11/12/21</a:t>
             </a:fld>
             <a:endParaRPr lang="en-US"/>
           </a:p>
@@ -1138,7 +1139,7 @@
           <a:p>
             <a:fld id="{FB69B2FA-2205-7E4B-BB99-6DB8770A7B65}" type="datetimeFigureOut">
               <a:rPr lang="en-US" smtClean="0"/>
-              <a:t>11/11/21</a:t>
+              <a:t>11/12/21</a:t>
             </a:fld>
             <a:endParaRPr lang="en-US"/>
           </a:p>
@@ -1403,7 +1404,7 @@
           <a:p>
             <a:fld id="{FB69B2FA-2205-7E4B-BB99-6DB8770A7B65}" type="datetimeFigureOut">
               <a:rPr lang="en-US" smtClean="0"/>
-              <a:t>11/11/21</a:t>
+              <a:t>11/12/21</a:t>
             </a:fld>
             <a:endParaRPr lang="en-US"/>
           </a:p>
@@ -1815,7 +1816,7 @@
           <a:p>
             <a:fld id="{FB69B2FA-2205-7E4B-BB99-6DB8770A7B65}" type="datetimeFigureOut">
               <a:rPr lang="en-US" smtClean="0"/>
-              <a:t>11/11/21</a:t>
+              <a:t>11/12/21</a:t>
             </a:fld>
             <a:endParaRPr lang="en-US"/>
           </a:p>
@@ -1956,7 +1957,7 @@
           <a:p>
             <a:fld id="{FB69B2FA-2205-7E4B-BB99-6DB8770A7B65}" type="datetimeFigureOut">
               <a:rPr lang="en-US" smtClean="0"/>
-              <a:t>11/11/21</a:t>
+              <a:t>11/12/21</a:t>
             </a:fld>
             <a:endParaRPr lang="en-US"/>
           </a:p>
@@ -2069,7 +2070,7 @@
           <a:p>
             <a:fld id="{FB69B2FA-2205-7E4B-BB99-6DB8770A7B65}" type="datetimeFigureOut">
               <a:rPr lang="en-US" smtClean="0"/>
-              <a:t>11/11/21</a:t>
+              <a:t>11/12/21</a:t>
             </a:fld>
             <a:endParaRPr lang="en-US"/>
           </a:p>
@@ -2380,7 +2381,7 @@
           <a:p>
             <a:fld id="{FB69B2FA-2205-7E4B-BB99-6DB8770A7B65}" type="datetimeFigureOut">
               <a:rPr lang="en-US" smtClean="0"/>
-              <a:t>11/11/21</a:t>
+              <a:t>11/12/21</a:t>
             </a:fld>
             <a:endParaRPr lang="en-US"/>
           </a:p>
@@ -2668,7 +2669,7 @@
           <a:p>
             <a:fld id="{FB69B2FA-2205-7E4B-BB99-6DB8770A7B65}" type="datetimeFigureOut">
               <a:rPr lang="en-US" smtClean="0"/>
-              <a:t>11/11/21</a:t>
+              <a:t>11/12/21</a:t>
             </a:fld>
             <a:endParaRPr lang="en-US"/>
           </a:p>
@@ -2909,7 +2910,7 @@
           <a:p>
             <a:fld id="{FB69B2FA-2205-7E4B-BB99-6DB8770A7B65}" type="datetimeFigureOut">
               <a:rPr lang="en-US" smtClean="0"/>
-              <a:t>11/11/21</a:t>
+              <a:t>11/12/21</a:t>
             </a:fld>
             <a:endParaRPr lang="en-US"/>
           </a:p>
@@ -3838,6 +3839,493 @@
 </p:sld>
 </file>
 
+<file path=ppt/slides/slide2.xml><?xml version="1.0" encoding="utf-8"?>
+<p:sld xmlns:a="http://schemas.openxmlformats.org/drawingml/2006/main" xmlns:r="http://schemas.openxmlformats.org/officeDocument/2006/relationships" xmlns:p="http://schemas.openxmlformats.org/presentationml/2006/main">
+  <p:cSld>
+    <p:spTree>
+      <p:nvGrpSpPr>
+        <p:cNvPr id="1" name=""/>
+        <p:cNvGrpSpPr/>
+        <p:nvPr/>
+      </p:nvGrpSpPr>
+      <p:grpSpPr>
+        <a:xfrm>
+          <a:off x="0" y="0"/>
+          <a:ext cx="0" cy="0"/>
+          <a:chOff x="0" y="0"/>
+          <a:chExt cx="0" cy="0"/>
+        </a:xfrm>
+      </p:grpSpPr>
+      <p:grpSp>
+        <p:nvGrpSpPr>
+          <p:cNvPr id="19" name="Group 18">
+            <a:extLst>
+              <a:ext uri="{FF2B5EF4-FFF2-40B4-BE49-F238E27FC236}">
+                <a16:creationId xmlns:a16="http://schemas.microsoft.com/office/drawing/2014/main" id="{0C630963-E34A-C444-836A-D4065B2A3BE1}"/>
+              </a:ext>
+            </a:extLst>
+          </p:cNvPr>
+          <p:cNvGrpSpPr/>
+          <p:nvPr/>
+        </p:nvGrpSpPr>
+        <p:grpSpPr>
+          <a:xfrm>
+            <a:off x="336550" y="565150"/>
+            <a:ext cx="11518900" cy="5727700"/>
+            <a:chOff x="336550" y="565150"/>
+            <a:chExt cx="11518900" cy="5727700"/>
+          </a:xfrm>
+        </p:grpSpPr>
+        <p:pic>
+          <p:nvPicPr>
+            <p:cNvPr id="4" name="Picture 3">
+              <a:extLst>
+                <a:ext uri="{FF2B5EF4-FFF2-40B4-BE49-F238E27FC236}">
+                  <a16:creationId xmlns:a16="http://schemas.microsoft.com/office/drawing/2014/main" id="{1CE0C607-B068-FA43-8EA1-D1950EE9542F}"/>
+                </a:ext>
+              </a:extLst>
+            </p:cNvPr>
+            <p:cNvPicPr>
+              <a:picLocks noChangeAspect="1"/>
+            </p:cNvPicPr>
+            <p:nvPr/>
+          </p:nvPicPr>
+          <p:blipFill>
+            <a:blip r:embed="rId2"/>
+            <a:stretch>
+              <a:fillRect/>
+            </a:stretch>
+          </p:blipFill>
+          <p:spPr>
+            <a:xfrm>
+              <a:off x="336550" y="565150"/>
+              <a:ext cx="11518900" cy="5727700"/>
+            </a:xfrm>
+            <a:prstGeom prst="rect">
+              <a:avLst/>
+            </a:prstGeom>
+          </p:spPr>
+        </p:pic>
+        <p:cxnSp>
+          <p:nvCxnSpPr>
+            <p:cNvPr id="6" name="Straight Arrow Connector 5">
+              <a:extLst>
+                <a:ext uri="{FF2B5EF4-FFF2-40B4-BE49-F238E27FC236}">
+                  <a16:creationId xmlns:a16="http://schemas.microsoft.com/office/drawing/2014/main" id="{AB4583BE-8EF9-1C42-A64B-B57E1B82973B}"/>
+                </a:ext>
+              </a:extLst>
+            </p:cNvPr>
+            <p:cNvCxnSpPr/>
+            <p:nvPr/>
+          </p:nvCxnSpPr>
+          <p:spPr>
+            <a:xfrm>
+              <a:off x="509286" y="694481"/>
+              <a:ext cx="925975" cy="1169043"/>
+            </a:xfrm>
+            <a:prstGeom prst="straightConnector1">
+              <a:avLst/>
+            </a:prstGeom>
+            <a:ln w="57150">
+              <a:solidFill>
+                <a:srgbClr val="FF0000"/>
+              </a:solidFill>
+              <a:tailEnd type="triangle"/>
+            </a:ln>
+          </p:spPr>
+          <p:style>
+            <a:lnRef idx="1">
+              <a:schemeClr val="accent1"/>
+            </a:lnRef>
+            <a:fillRef idx="0">
+              <a:schemeClr val="accent1"/>
+            </a:fillRef>
+            <a:effectRef idx="0">
+              <a:schemeClr val="accent1"/>
+            </a:effectRef>
+            <a:fontRef idx="minor">
+              <a:schemeClr val="tx1"/>
+            </a:fontRef>
+          </p:style>
+        </p:cxnSp>
+        <p:sp>
+          <p:nvSpPr>
+            <p:cNvPr id="13" name="Freeform 12">
+              <a:extLst>
+                <a:ext uri="{FF2B5EF4-FFF2-40B4-BE49-F238E27FC236}">
+                  <a16:creationId xmlns:a16="http://schemas.microsoft.com/office/drawing/2014/main" id="{08FEAC12-1852-A645-B230-6F1A42CB0BA5}"/>
+                </a:ext>
+              </a:extLst>
+            </p:cNvPr>
+            <p:cNvSpPr/>
+            <p:nvPr/>
+          </p:nvSpPr>
+          <p:spPr>
+            <a:xfrm>
+              <a:off x="1990846" y="775503"/>
+              <a:ext cx="3970116" cy="3206187"/>
+            </a:xfrm>
+            <a:custGeom>
+              <a:avLst/>
+              <a:gdLst>
+                <a:gd name="connsiteX0" fmla="*/ 0 w 3970116"/>
+                <a:gd name="connsiteY0" fmla="*/ 0 h 3287210"/>
+                <a:gd name="connsiteX1" fmla="*/ 578734 w 3970116"/>
+                <a:gd name="connsiteY1" fmla="*/ 1076446 h 3287210"/>
+                <a:gd name="connsiteX2" fmla="*/ 3368232 w 3970116"/>
+                <a:gd name="connsiteY2" fmla="*/ 2025570 h 3287210"/>
+                <a:gd name="connsiteX3" fmla="*/ 3970116 w 3970116"/>
+                <a:gd name="connsiteY3" fmla="*/ 3287210 h 3287210"/>
+              </a:gdLst>
+              <a:ahLst/>
+              <a:cxnLst>
+                <a:cxn ang="0">
+                  <a:pos x="connsiteX0" y="connsiteY0"/>
+                </a:cxn>
+                <a:cxn ang="0">
+                  <a:pos x="connsiteX1" y="connsiteY1"/>
+                </a:cxn>
+                <a:cxn ang="0">
+                  <a:pos x="connsiteX2" y="connsiteY2"/>
+                </a:cxn>
+                <a:cxn ang="0">
+                  <a:pos x="connsiteX3" y="connsiteY3"/>
+                </a:cxn>
+              </a:cxnLst>
+              <a:rect l="l" t="t" r="r" b="b"/>
+              <a:pathLst>
+                <a:path w="3970116" h="3287210">
+                  <a:moveTo>
+                    <a:pt x="0" y="0"/>
+                  </a:moveTo>
+                  <a:lnTo>
+                    <a:pt x="578734" y="1076446"/>
+                  </a:lnTo>
+                  <a:lnTo>
+                    <a:pt x="3368232" y="2025570"/>
+                  </a:lnTo>
+                  <a:lnTo>
+                    <a:pt x="3970116" y="3287210"/>
+                  </a:lnTo>
+                </a:path>
+              </a:pathLst>
+            </a:custGeom>
+            <a:noFill/>
+            <a:ln w="57150">
+              <a:solidFill>
+                <a:srgbClr val="FF0000"/>
+              </a:solidFill>
+              <a:headEnd type="none" w="med" len="med"/>
+              <a:tailEnd type="triangle" w="med" len="med"/>
+            </a:ln>
+          </p:spPr>
+          <p:style>
+            <a:lnRef idx="2">
+              <a:schemeClr val="accent1">
+                <a:shade val="50000"/>
+              </a:schemeClr>
+            </a:lnRef>
+            <a:fillRef idx="1">
+              <a:schemeClr val="accent1"/>
+            </a:fillRef>
+            <a:effectRef idx="0">
+              <a:schemeClr val="accent1"/>
+            </a:effectRef>
+            <a:fontRef idx="minor">
+              <a:schemeClr val="lt1"/>
+            </a:fontRef>
+          </p:style>
+          <p:txBody>
+            <a:bodyPr rtlCol="0" anchor="ctr"/>
+            <a:lstStyle/>
+            <a:p>
+              <a:pPr algn="ctr"/>
+              <a:endParaRPr lang="en-US"/>
+            </a:p>
+          </p:txBody>
+        </p:sp>
+        <p:sp>
+          <p:nvSpPr>
+            <p:cNvPr id="15" name="Freeform 14">
+              <a:extLst>
+                <a:ext uri="{FF2B5EF4-FFF2-40B4-BE49-F238E27FC236}">
+                  <a16:creationId xmlns:a16="http://schemas.microsoft.com/office/drawing/2014/main" id="{4AD7D2F4-7A72-CB42-868C-29189FC37158}"/>
+                </a:ext>
+              </a:extLst>
+            </p:cNvPr>
+            <p:cNvSpPr/>
+            <p:nvPr/>
+          </p:nvSpPr>
+          <p:spPr>
+            <a:xfrm>
+              <a:off x="2222339" y="671332"/>
+              <a:ext cx="5567423" cy="1551007"/>
+            </a:xfrm>
+            <a:custGeom>
+              <a:avLst/>
+              <a:gdLst>
+                <a:gd name="connsiteX0" fmla="*/ 0 w 5567423"/>
+                <a:gd name="connsiteY0" fmla="*/ 0 h 1551007"/>
+                <a:gd name="connsiteX1" fmla="*/ 3449256 w 5567423"/>
+                <a:gd name="connsiteY1" fmla="*/ 300941 h 1551007"/>
+                <a:gd name="connsiteX2" fmla="*/ 5567423 w 5567423"/>
+                <a:gd name="connsiteY2" fmla="*/ 1551007 h 1551007"/>
+              </a:gdLst>
+              <a:ahLst/>
+              <a:cxnLst>
+                <a:cxn ang="0">
+                  <a:pos x="connsiteX0" y="connsiteY0"/>
+                </a:cxn>
+                <a:cxn ang="0">
+                  <a:pos x="connsiteX1" y="connsiteY1"/>
+                </a:cxn>
+                <a:cxn ang="0">
+                  <a:pos x="connsiteX2" y="connsiteY2"/>
+                </a:cxn>
+              </a:cxnLst>
+              <a:rect l="l" t="t" r="r" b="b"/>
+              <a:pathLst>
+                <a:path w="5567423" h="1551007">
+                  <a:moveTo>
+                    <a:pt x="0" y="0"/>
+                  </a:moveTo>
+                  <a:lnTo>
+                    <a:pt x="3449256" y="300941"/>
+                  </a:lnTo>
+                  <a:lnTo>
+                    <a:pt x="5567423" y="1551007"/>
+                  </a:lnTo>
+                </a:path>
+              </a:pathLst>
+            </a:custGeom>
+            <a:noFill/>
+            <a:ln w="57150">
+              <a:solidFill>
+                <a:srgbClr val="FF0000"/>
+              </a:solidFill>
+              <a:headEnd type="none" w="med" len="med"/>
+              <a:tailEnd type="triangle" w="med" len="med"/>
+            </a:ln>
+          </p:spPr>
+          <p:style>
+            <a:lnRef idx="2">
+              <a:schemeClr val="accent1">
+                <a:shade val="50000"/>
+              </a:schemeClr>
+            </a:lnRef>
+            <a:fillRef idx="1">
+              <a:schemeClr val="accent1"/>
+            </a:fillRef>
+            <a:effectRef idx="0">
+              <a:schemeClr val="accent1"/>
+            </a:effectRef>
+            <a:fontRef idx="minor">
+              <a:schemeClr val="lt1"/>
+            </a:fontRef>
+          </p:style>
+          <p:txBody>
+            <a:bodyPr rtlCol="0" anchor="ctr"/>
+            <a:lstStyle/>
+            <a:p>
+              <a:pPr algn="ctr"/>
+              <a:endParaRPr lang="en-US"/>
+            </a:p>
+          </p:txBody>
+        </p:sp>
+        <p:sp>
+          <p:nvSpPr>
+            <p:cNvPr id="16" name="TextBox 15">
+              <a:extLst>
+                <a:ext uri="{FF2B5EF4-FFF2-40B4-BE49-F238E27FC236}">
+                  <a16:creationId xmlns:a16="http://schemas.microsoft.com/office/drawing/2014/main" id="{879FC55C-2568-B544-96E3-807E12A34178}"/>
+                </a:ext>
+              </a:extLst>
+            </p:cNvPr>
+            <p:cNvSpPr txBox="1"/>
+            <p:nvPr/>
+          </p:nvSpPr>
+          <p:spPr>
+            <a:xfrm>
+              <a:off x="873006" y="1992924"/>
+              <a:ext cx="1448602" cy="923330"/>
+            </a:xfrm>
+            <a:prstGeom prst="rect">
+              <a:avLst/>
+            </a:prstGeom>
+            <a:noFill/>
+          </p:spPr>
+          <p:txBody>
+            <a:bodyPr wrap="none" rtlCol="0">
+              <a:spAutoFit/>
+            </a:bodyPr>
+            <a:lstStyle/>
+            <a:p>
+              <a:r>
+                <a:rPr lang="en-US" dirty="0" err="1"/>
+                <a:t>Pluma</a:t>
+              </a:r>
+              <a:r>
+                <a:rPr lang="en-US" dirty="0"/>
+                <a:t> Editor:</a:t>
+              </a:r>
+            </a:p>
+            <a:p>
+              <a:r>
+                <a:rPr lang="en-US" dirty="0"/>
+                <a:t>To </a:t>
+              </a:r>
+              <a:r>
+                <a:rPr lang="en-US" b="1" i="1" dirty="0"/>
+                <a:t>write</a:t>
+              </a:r>
+              <a:r>
+                <a:rPr lang="en-US" dirty="0"/>
+                <a:t> code</a:t>
+              </a:r>
+            </a:p>
+            <a:p>
+              <a:endParaRPr lang="en-US" dirty="0"/>
+            </a:p>
+          </p:txBody>
+        </p:sp>
+        <p:sp>
+          <p:nvSpPr>
+            <p:cNvPr id="17" name="TextBox 16">
+              <a:extLst>
+                <a:ext uri="{FF2B5EF4-FFF2-40B4-BE49-F238E27FC236}">
+                  <a16:creationId xmlns:a16="http://schemas.microsoft.com/office/drawing/2014/main" id="{B4E5215C-17B3-9D4A-A912-E4ED0C122008}"/>
+                </a:ext>
+              </a:extLst>
+            </p:cNvPr>
+            <p:cNvSpPr txBox="1"/>
+            <p:nvPr/>
+          </p:nvSpPr>
+          <p:spPr>
+            <a:xfrm>
+              <a:off x="5006050" y="4344513"/>
+              <a:ext cx="1689052" cy="923330"/>
+            </a:xfrm>
+            <a:prstGeom prst="rect">
+              <a:avLst/>
+            </a:prstGeom>
+            <a:noFill/>
+          </p:spPr>
+          <p:txBody>
+            <a:bodyPr wrap="none" rtlCol="0">
+              <a:spAutoFit/>
+            </a:bodyPr>
+            <a:lstStyle/>
+            <a:p>
+              <a:r>
+                <a:rPr lang="en-US" dirty="0">
+                  <a:solidFill>
+                    <a:schemeClr val="bg1"/>
+                  </a:solidFill>
+                </a:rPr>
+                <a:t>Terminal:</a:t>
+              </a:r>
+            </a:p>
+            <a:p>
+              <a:r>
+                <a:rPr lang="en-US" dirty="0">
+                  <a:solidFill>
+                    <a:schemeClr val="bg1"/>
+                  </a:solidFill>
+                </a:rPr>
+                <a:t>To </a:t>
+              </a:r>
+              <a:r>
+                <a:rPr lang="en-US" b="1" i="1" dirty="0">
+                  <a:solidFill>
+                    <a:schemeClr val="bg1"/>
+                  </a:solidFill>
+                </a:rPr>
+                <a:t>execute</a:t>
+              </a:r>
+              <a:r>
+                <a:rPr lang="en-US" dirty="0">
+                  <a:solidFill>
+                    <a:schemeClr val="bg1"/>
+                  </a:solidFill>
+                </a:rPr>
+                <a:t> code</a:t>
+              </a:r>
+            </a:p>
+            <a:p>
+              <a:endParaRPr lang="en-US" dirty="0">
+                <a:solidFill>
+                  <a:schemeClr val="bg1"/>
+                </a:solidFill>
+              </a:endParaRPr>
+            </a:p>
+          </p:txBody>
+        </p:sp>
+        <p:sp>
+          <p:nvSpPr>
+            <p:cNvPr id="18" name="TextBox 17">
+              <a:extLst>
+                <a:ext uri="{FF2B5EF4-FFF2-40B4-BE49-F238E27FC236}">
+                  <a16:creationId xmlns:a16="http://schemas.microsoft.com/office/drawing/2014/main" id="{9986E711-4DE0-9244-9128-CAC0BC0F1314}"/>
+                </a:ext>
+              </a:extLst>
+            </p:cNvPr>
+            <p:cNvSpPr txBox="1"/>
+            <p:nvPr/>
+          </p:nvSpPr>
+          <p:spPr>
+            <a:xfrm>
+              <a:off x="9487382" y="4322726"/>
+              <a:ext cx="1656223" cy="923330"/>
+            </a:xfrm>
+            <a:prstGeom prst="rect">
+              <a:avLst/>
+            </a:prstGeom>
+            <a:noFill/>
+          </p:spPr>
+          <p:txBody>
+            <a:bodyPr wrap="none" rtlCol="0">
+              <a:spAutoFit/>
+            </a:bodyPr>
+            <a:lstStyle/>
+            <a:p>
+              <a:r>
+                <a:rPr lang="en-US" dirty="0"/>
+                <a:t>Firefox:</a:t>
+              </a:r>
+            </a:p>
+            <a:p>
+              <a:r>
+                <a:rPr lang="en-US" dirty="0"/>
+                <a:t>To </a:t>
+              </a:r>
+              <a:r>
+                <a:rPr lang="en-US" b="1" i="1" dirty="0"/>
+                <a:t>look up </a:t>
+              </a:r>
+              <a:r>
+                <a:rPr lang="en-US" dirty="0"/>
+                <a:t>code</a:t>
+              </a:r>
+            </a:p>
+            <a:p>
+              <a:endParaRPr lang="en-US" dirty="0"/>
+            </a:p>
+          </p:txBody>
+        </p:sp>
+      </p:grpSp>
+    </p:spTree>
+    <p:extLst>
+      <p:ext uri="{BB962C8B-B14F-4D97-AF65-F5344CB8AC3E}">
+        <p14:creationId xmlns:p14="http://schemas.microsoft.com/office/powerpoint/2010/main" val="2432502045"/>
+      </p:ext>
+    </p:extLst>
+  </p:cSld>
+  <p:clrMapOvr>
+    <a:masterClrMapping/>
+  </p:clrMapOvr>
+</p:sld>
+</file>
+
 <file path=ppt/theme/theme1.xml><?xml version="1.0" encoding="utf-8"?>
 <a:theme xmlns:a="http://schemas.openxmlformats.org/drawingml/2006/main" name="Office Theme">
   <a:themeElements>

</xml_diff>